<commit_message>
modified Prcess_vs_Thread.pptx and pdf
</commit_message>
<xml_diff>
--- a/CS/Process_VS_Thread.pptx
+++ b/CS/Process_VS_Thread.pptx
@@ -130,6 +130,9 @@
         </p14:section>
       </p14:sectionLst>
     </p:ext>
+    <p:ext uri="{EFAFB233-063F-42B5-8137-9DF3F51BA10A}">
+      <p15:sldGuideLst xmlns:p15="http://schemas.microsoft.com/office/powerpoint/2012/main"/>
+    </p:ext>
   </p:extLst>
 </p:presentation>
 </file>
@@ -283,7 +286,7 @@
           <a:p>
             <a:fld id="{D2B1D1DB-B541-ED48-8F59-602EA5FC26DB}" type="datetimeFigureOut">
               <a:rPr lang="en-KR" smtClean="0"/>
-              <a:t>2021/12/05</a:t>
+              <a:t>2021/12/06</a:t>
             </a:fld>
             <a:endParaRPr lang="en-KR"/>
           </a:p>
@@ -483,7 +486,7 @@
           <a:p>
             <a:fld id="{D2B1D1DB-B541-ED48-8F59-602EA5FC26DB}" type="datetimeFigureOut">
               <a:rPr lang="en-KR" smtClean="0"/>
-              <a:t>2021/12/05</a:t>
+              <a:t>2021/12/06</a:t>
             </a:fld>
             <a:endParaRPr lang="en-KR"/>
           </a:p>
@@ -693,7 +696,7 @@
           <a:p>
             <a:fld id="{D2B1D1DB-B541-ED48-8F59-602EA5FC26DB}" type="datetimeFigureOut">
               <a:rPr lang="en-KR" smtClean="0"/>
-              <a:t>2021/12/05</a:t>
+              <a:t>2021/12/06</a:t>
             </a:fld>
             <a:endParaRPr lang="en-KR"/>
           </a:p>
@@ -893,7 +896,7 @@
           <a:p>
             <a:fld id="{D2B1D1DB-B541-ED48-8F59-602EA5FC26DB}" type="datetimeFigureOut">
               <a:rPr lang="en-KR" smtClean="0"/>
-              <a:t>2021/12/05</a:t>
+              <a:t>2021/12/06</a:t>
             </a:fld>
             <a:endParaRPr lang="en-KR"/>
           </a:p>
@@ -1169,7 +1172,7 @@
           <a:p>
             <a:fld id="{D2B1D1DB-B541-ED48-8F59-602EA5FC26DB}" type="datetimeFigureOut">
               <a:rPr lang="en-KR" smtClean="0"/>
-              <a:t>2021/12/05</a:t>
+              <a:t>2021/12/06</a:t>
             </a:fld>
             <a:endParaRPr lang="en-KR"/>
           </a:p>
@@ -1437,7 +1440,7 @@
           <a:p>
             <a:fld id="{D2B1D1DB-B541-ED48-8F59-602EA5FC26DB}" type="datetimeFigureOut">
               <a:rPr lang="en-KR" smtClean="0"/>
-              <a:t>2021/12/05</a:t>
+              <a:t>2021/12/06</a:t>
             </a:fld>
             <a:endParaRPr lang="en-KR"/>
           </a:p>
@@ -1852,7 +1855,7 @@
           <a:p>
             <a:fld id="{D2B1D1DB-B541-ED48-8F59-602EA5FC26DB}" type="datetimeFigureOut">
               <a:rPr lang="en-KR" smtClean="0"/>
-              <a:t>2021/12/05</a:t>
+              <a:t>2021/12/06</a:t>
             </a:fld>
             <a:endParaRPr lang="en-KR"/>
           </a:p>
@@ -1994,7 +1997,7 @@
           <a:p>
             <a:fld id="{D2B1D1DB-B541-ED48-8F59-602EA5FC26DB}" type="datetimeFigureOut">
               <a:rPr lang="en-KR" smtClean="0"/>
-              <a:t>2021/12/05</a:t>
+              <a:t>2021/12/06</a:t>
             </a:fld>
             <a:endParaRPr lang="en-KR"/>
           </a:p>
@@ -2107,7 +2110,7 @@
           <a:p>
             <a:fld id="{D2B1D1DB-B541-ED48-8F59-602EA5FC26DB}" type="datetimeFigureOut">
               <a:rPr lang="en-KR" smtClean="0"/>
-              <a:t>2021/12/05</a:t>
+              <a:t>2021/12/06</a:t>
             </a:fld>
             <a:endParaRPr lang="en-KR"/>
           </a:p>
@@ -2420,7 +2423,7 @@
           <a:p>
             <a:fld id="{D2B1D1DB-B541-ED48-8F59-602EA5FC26DB}" type="datetimeFigureOut">
               <a:rPr lang="en-KR" smtClean="0"/>
-              <a:t>2021/12/05</a:t>
+              <a:t>2021/12/06</a:t>
             </a:fld>
             <a:endParaRPr lang="en-KR"/>
           </a:p>
@@ -2709,7 +2712,7 @@
           <a:p>
             <a:fld id="{D2B1D1DB-B541-ED48-8F59-602EA5FC26DB}" type="datetimeFigureOut">
               <a:rPr lang="en-KR" smtClean="0"/>
-              <a:t>2021/12/05</a:t>
+              <a:t>2021/12/06</a:t>
             </a:fld>
             <a:endParaRPr lang="en-KR"/>
           </a:p>
@@ -2952,7 +2955,7 @@
           <a:p>
             <a:fld id="{D2B1D1DB-B541-ED48-8F59-602EA5FC26DB}" type="datetimeFigureOut">
               <a:rPr lang="en-KR" smtClean="0"/>
-              <a:t>2021/12/05</a:t>
+              <a:t>2021/12/06</a:t>
             </a:fld>
             <a:endParaRPr lang="en-KR"/>
           </a:p>
@@ -8678,7 +8681,7 @@
         <p:spPr>
           <a:xfrm>
             <a:off x="6754365" y="1870227"/>
-            <a:ext cx="4928248" cy="3477875"/>
+            <a:ext cx="4928248" cy="4031873"/>
           </a:xfrm>
           <a:prstGeom prst="rect">
             <a:avLst/>
@@ -8800,6 +8803,24 @@
               <a:rPr lang="en-US" altLang="ko-KR" dirty="0">
                 <a:latin typeface="+mn-ea"/>
               </a:rPr>
+              <a:t>Multi process</a:t>
+            </a:r>
+            <a:r>
+              <a:rPr lang="ko-KR" altLang="en-US" dirty="0" err="1">
+                <a:latin typeface="+mn-ea"/>
+              </a:rPr>
+              <a:t>를</a:t>
+            </a:r>
+            <a:r>
+              <a:rPr lang="ko-KR" altLang="en-US" dirty="0">
+                <a:latin typeface="+mn-ea"/>
+              </a:rPr>
+              <a:t> 활용한다면 </a:t>
+            </a:r>
+            <a:r>
+              <a:rPr lang="en-US" altLang="ko-KR" dirty="0">
+                <a:latin typeface="+mn-ea"/>
+              </a:rPr>
               <a:t>Parallelism</a:t>
             </a:r>
             <a:r>
@@ -8832,11 +8853,83 @@
             </a:r>
             <a:r>
               <a:rPr lang="en-US" altLang="ko-KR" dirty="0"/>
+              <a:t>Process</a:t>
+            </a:r>
+            <a:r>
+              <a:rPr lang="ko-KR" altLang="en-US" dirty="0"/>
+              <a:t> 내 </a:t>
+            </a:r>
+            <a:r>
+              <a:rPr lang="en-US" altLang="ko-KR" dirty="0"/>
+              <a:t>Code,</a:t>
+            </a:r>
+            <a:r>
+              <a:rPr lang="ko-KR" altLang="en-US" dirty="0"/>
+              <a:t> </a:t>
+            </a:r>
+            <a:r>
+              <a:rPr lang="en-US" altLang="ko-KR" dirty="0"/>
+              <a:t>Data, Heap </a:t>
+            </a:r>
+            <a:r>
+              <a:rPr lang="ko-KR" altLang="en-US" dirty="0"/>
+              <a:t>자원을 공유한다</a:t>
+            </a:r>
+            <a:r>
+              <a:rPr lang="en-US" altLang="ko-KR" dirty="0"/>
+              <a:t>.</a:t>
+            </a:r>
+          </a:p>
+          <a:p>
+            <a:pPr marL="285750" indent="-285750">
+              <a:buFontTx/>
+              <a:buChar char="-"/>
+            </a:pPr>
+            <a:r>
+              <a:rPr lang="ko-KR" altLang="en-US" dirty="0"/>
+              <a:t>하나의 </a:t>
+            </a:r>
+            <a:r>
+              <a:rPr lang="en-US" altLang="ko-KR" dirty="0"/>
               <a:t>Thread</a:t>
             </a:r>
             <a:r>
               <a:rPr lang="ko-KR" altLang="en-US" dirty="0"/>
-              <a:t>는 </a:t>
+              <a:t>는 독자적인 </a:t>
+            </a:r>
+            <a:r>
+              <a:rPr lang="en-US" altLang="ko-KR" dirty="0"/>
+              <a:t>Stack</a:t>
+            </a:r>
+            <a:r>
+              <a:rPr lang="ko-KR" altLang="en-US" dirty="0"/>
+              <a:t>을 사용한다</a:t>
+            </a:r>
+            <a:r>
+              <a:rPr lang="en-US" altLang="ko-KR" dirty="0"/>
+              <a:t>.</a:t>
+            </a:r>
+          </a:p>
+          <a:p>
+            <a:r>
+              <a:rPr lang="en-US" altLang="ko-KR" dirty="0"/>
+              <a:t>-</a:t>
+            </a:r>
+            <a:r>
+              <a:rPr lang="ko-KR" altLang="en-US" dirty="0"/>
+              <a:t> </a:t>
+            </a:r>
+            <a:r>
+              <a:rPr lang="en-US" altLang="ko-KR" dirty="0"/>
+              <a:t>Multi Thread</a:t>
+            </a:r>
+            <a:r>
+              <a:rPr lang="ko-KR" altLang="en-US" dirty="0" err="1"/>
+              <a:t>를</a:t>
+            </a:r>
+            <a:r>
+              <a:rPr lang="ko-KR" altLang="en-US" dirty="0"/>
+              <a:t> 활용한다면 </a:t>
             </a:r>
             <a:r>
               <a:rPr lang="en-US" altLang="ko-KR" dirty="0"/>
@@ -8845,74 +8938,6 @@
             <a:r>
               <a:rPr lang="ko-KR" altLang="en-US" dirty="0"/>
               <a:t>한 특성을 갖는다</a:t>
-            </a:r>
-            <a:r>
-              <a:rPr lang="en-US" altLang="ko-KR" dirty="0"/>
-              <a:t>.</a:t>
-            </a:r>
-          </a:p>
-          <a:p>
-            <a:r>
-              <a:rPr lang="en-US" altLang="ko-KR" dirty="0"/>
-              <a:t>-</a:t>
-            </a:r>
-            <a:r>
-              <a:rPr lang="ko-KR" altLang="en-US" dirty="0"/>
-              <a:t> </a:t>
-            </a:r>
-            <a:r>
-              <a:rPr lang="en-US" altLang="ko-KR" dirty="0"/>
-              <a:t>Process</a:t>
-            </a:r>
-            <a:r>
-              <a:rPr lang="ko-KR" altLang="en-US" dirty="0"/>
-              <a:t> 내 </a:t>
-            </a:r>
-            <a:r>
-              <a:rPr lang="en-US" altLang="ko-KR" dirty="0"/>
-              <a:t>Code,</a:t>
-            </a:r>
-            <a:r>
-              <a:rPr lang="ko-KR" altLang="en-US" dirty="0"/>
-              <a:t> </a:t>
-            </a:r>
-            <a:r>
-              <a:rPr lang="en-US" altLang="ko-KR" dirty="0"/>
-              <a:t>Data, Heap </a:t>
-            </a:r>
-            <a:r>
-              <a:rPr lang="ko-KR" altLang="en-US" dirty="0"/>
-              <a:t>자원을 공유한다</a:t>
-            </a:r>
-            <a:r>
-              <a:rPr lang="en-US" altLang="ko-KR" dirty="0"/>
-              <a:t>.</a:t>
-            </a:r>
-          </a:p>
-          <a:p>
-            <a:r>
-              <a:rPr lang="en-US" altLang="ko-KR" dirty="0"/>
-              <a:t>-</a:t>
-            </a:r>
-            <a:r>
-              <a:rPr lang="ko-KR" altLang="en-US" dirty="0"/>
-              <a:t> 하나의 </a:t>
-            </a:r>
-            <a:r>
-              <a:rPr lang="en-US" altLang="ko-KR" dirty="0"/>
-              <a:t>Thread</a:t>
-            </a:r>
-            <a:r>
-              <a:rPr lang="ko-KR" altLang="en-US" dirty="0"/>
-              <a:t>는 독자적인 </a:t>
-            </a:r>
-            <a:r>
-              <a:rPr lang="en-US" altLang="ko-KR" dirty="0"/>
-              <a:t>Stack</a:t>
-            </a:r>
-            <a:r>
-              <a:rPr lang="ko-KR" altLang="en-US" dirty="0"/>
-              <a:t>을 사용한다</a:t>
             </a:r>
             <a:r>
               <a:rPr lang="en-US" altLang="ko-KR" dirty="0"/>

</xml_diff>